<commit_message>
Readded pain directory to be suitable for Windows and updates catalogue picture in intro slides
</commit_message>
<xml_diff>
--- a/overview_presentations/Why_good_data_curation_is_essential_for_good_science.pptx
+++ b/overview_presentations/Why_good_data_curation_is_essential_for_good_science.pptx
@@ -245,7 +245,7 @@
           <a:p>
             <a:fld id="{602A5C54-88BD-4264-8EA7-A39AC167FEFC}" type="datetimeFigureOut">
               <a:rPr lang="en-GB" smtClean="0"/>
-              <a:t>10/11/2017</a:t>
+              <a:t>24/09/2018</a:t>
             </a:fld>
             <a:endParaRPr lang="en-GB"/>
           </a:p>
@@ -1781,7 +1781,7 @@
               <a:pPr>
                 <a:defRPr/>
               </a:pPr>
-              <a:t>11/11/2017</a:t>
+              <a:t>24/09/2018</a:t>
             </a:fld>
             <a:endParaRPr lang="en-GB" altLang="en-US"/>
           </a:p>
@@ -2012,7 +2012,7 @@
               <a:pPr>
                 <a:defRPr/>
               </a:pPr>
-              <a:t>11/11/2017</a:t>
+              <a:t>24/09/2018</a:t>
             </a:fld>
             <a:endParaRPr lang="en-GB" altLang="en-US"/>
           </a:p>
@@ -2233,7 +2233,7 @@
               <a:pPr>
                 <a:defRPr/>
               </a:pPr>
-              <a:t>11/11/2017</a:t>
+              <a:t>24/09/2018</a:t>
             </a:fld>
             <a:endParaRPr lang="en-GB" altLang="en-US"/>
           </a:p>
@@ -2764,7 +2764,7 @@
               <a:pPr>
                 <a:defRPr/>
               </a:pPr>
-              <a:t>11/11/2017</a:t>
+              <a:t>24/09/2018</a:t>
             </a:fld>
             <a:endParaRPr lang="en-GB" altLang="en-US"/>
           </a:p>
@@ -3237,7 +3237,7 @@
               <a:pPr>
                 <a:defRPr/>
               </a:pPr>
-              <a:t>11/11/2017</a:t>
+              <a:t>24/09/2018</a:t>
             </a:fld>
             <a:endParaRPr lang="en-GB" altLang="en-US"/>
           </a:p>
@@ -3406,7 +3406,7 @@
               <a:pPr>
                 <a:defRPr/>
               </a:pPr>
-              <a:t>11/11/2017</a:t>
+              <a:t>24/09/2018</a:t>
             </a:fld>
             <a:endParaRPr lang="en-GB" altLang="en-US"/>
           </a:p>
@@ -3552,7 +3552,7 @@
               <a:pPr>
                 <a:defRPr/>
               </a:pPr>
-              <a:t>11/11/2017</a:t>
+              <a:t>24/09/2018</a:t>
             </a:fld>
             <a:endParaRPr lang="en-GB" altLang="en-US"/>
           </a:p>
@@ -3907,7 +3907,7 @@
               <a:pPr>
                 <a:defRPr/>
               </a:pPr>
-              <a:t>11/11/2017</a:t>
+              <a:t>24/09/2018</a:t>
             </a:fld>
             <a:endParaRPr lang="en-GB" altLang="en-US"/>
           </a:p>
@@ -4214,7 +4214,7 @@
               <a:pPr>
                 <a:defRPr/>
               </a:pPr>
-              <a:t>11/11/2017</a:t>
+              <a:t>24/09/2018</a:t>
             </a:fld>
             <a:endParaRPr lang="en-GB" altLang="en-US"/>
           </a:p>
@@ -5873,13 +5873,7 @@
               <a:rPr lang="en-GB" sz="2400" dirty="0" smtClean="0">
                 <a:latin typeface="+mn-lt"/>
               </a:rPr>
-              <a:t>Some text characters are not represented in Unicode, e.g., ‘smart’ quotes: “ ” ‘ ’ and ‘non-printing’ characters – most often this results from copying and pasting from word processors and web </a:t>
-            </a:r>
-            <a:r>
-              <a:rPr lang="en-GB" sz="2400" dirty="0" smtClean="0">
-                <a:latin typeface="+mn-lt"/>
-              </a:rPr>
-              <a:t>browsers</a:t>
+              <a:t>Some text characters are not represented in Unicode, e.g., ‘smart’ quotes: “ ” ‘ ’ and ‘non-printing’ characters – most often this results from copying and pasting from word processors and web browsers</a:t>
             </a:r>
           </a:p>
           <a:p>
@@ -5910,19 +5904,7 @@
               <a:rPr lang="en-GB" sz="2400" dirty="0" smtClean="0">
                 <a:latin typeface="+mn-lt"/>
               </a:rPr>
-              <a:t>Moving between operating systems, e.g</a:t>
-            </a:r>
-            <a:r>
-              <a:rPr lang="en-GB" sz="2400" dirty="0" smtClean="0">
-                <a:latin typeface="+mn-lt"/>
-              </a:rPr>
-              <a:t>. </a:t>
-            </a:r>
-            <a:r>
-              <a:rPr lang="en-GB" sz="2400" dirty="0" smtClean="0">
-                <a:latin typeface="+mn-lt"/>
-              </a:rPr>
-              <a:t>Linux and Windows</a:t>
+              <a:t>Moving between operating systems, e.g. Linux and Windows</a:t>
             </a:r>
           </a:p>
           <a:p>
@@ -6815,16 +6797,7 @@
                 </a:solidFill>
                 <a:latin typeface="+mj-lt"/>
               </a:rPr>
-              <a:t>BADC-CSV </a:t>
-            </a:r>
-            <a:r>
-              <a:rPr lang="en-GB" sz="3200" b="1" dirty="0" smtClean="0">
-                <a:solidFill>
-                  <a:srgbClr val="000000"/>
-                </a:solidFill>
-                <a:latin typeface="+mj-lt"/>
-              </a:rPr>
-              <a:t>1</a:t>
+              <a:t>BADC-CSV 1</a:t>
             </a:r>
             <a:endParaRPr lang="en-GB" sz="3200" b="1" dirty="0">
               <a:solidFill>
@@ -7275,16 +7248,7 @@
                 </a:solidFill>
                 <a:latin typeface="+mj-lt"/>
               </a:rPr>
-              <a:t>BADC-CSV </a:t>
-            </a:r>
-            <a:r>
-              <a:rPr lang="en-GB" sz="3200" b="1" dirty="0" smtClean="0">
-                <a:solidFill>
-                  <a:srgbClr val="000000"/>
-                </a:solidFill>
-                <a:latin typeface="+mj-lt"/>
-              </a:rPr>
-              <a:t>2</a:t>
+              <a:t>BADC-CSV 2</a:t>
             </a:r>
             <a:endParaRPr lang="en-GB" sz="3200" b="1" dirty="0">
               <a:solidFill>
@@ -10875,15 +10839,7 @@
                   <a:schemeClr val="tx1"/>
                 </a:solidFill>
               </a:rPr>
-              <a:t>Searching for data </a:t>
-            </a:r>
-            <a:r>
-              <a:rPr lang="en-GB" sz="3200" b="1" dirty="0" smtClean="0">
-                <a:solidFill>
-                  <a:schemeClr val="tx1"/>
-                </a:solidFill>
-              </a:rPr>
-              <a:t>(3)</a:t>
+              <a:t>Searching for data (3)</a:t>
             </a:r>
             <a:endParaRPr lang="en-GB" sz="3200" b="1" dirty="0">
               <a:solidFill>
@@ -11165,7 +11121,7 @@
           </p:cNvPicPr>
           <p:nvPr/>
         </p:nvPicPr>
-        <p:blipFill rotWithShape="1">
+        <p:blipFill>
           <a:blip r:embed="rId2">
             <a:extLst>
               <a:ext uri="{28A0092B-C50C-407E-A947-70E740481C1C}">
@@ -11173,13 +11129,14 @@
               </a:ext>
             </a:extLst>
           </a:blip>
-          <a:srcRect t="19192" b="-20119"/>
-          <a:stretch/>
+          <a:stretch>
+            <a:fillRect/>
+          </a:stretch>
         </p:blipFill>
         <p:spPr>
           <a:xfrm>
-            <a:off x="422083" y="1836000"/>
-            <a:ext cx="8537144" cy="5364000"/>
+            <a:off x="256865" y="1844824"/>
+            <a:ext cx="8729846" cy="3888432"/>
           </a:xfrm>
           <a:prstGeom prst="rect">
             <a:avLst/>
@@ -18317,19 +18274,7 @@
               <a:rPr lang="en-GB" sz="2800" b="1" dirty="0" smtClean="0">
                 <a:latin typeface="+mj-lt"/>
               </a:rPr>
-              <a:t>         </a:t>
-            </a:r>
-            <a:r>
-              <a:rPr lang="en-GB" sz="2800" b="1" dirty="0" smtClean="0">
-                <a:latin typeface="+mj-lt"/>
-              </a:rPr>
-              <a:t>… </a:t>
-            </a:r>
-            <a:r>
-              <a:rPr lang="en-GB" sz="2800" b="1" dirty="0" smtClean="0">
-                <a:latin typeface="+mj-lt"/>
-              </a:rPr>
-              <a:t>but they make your life easier in the end</a:t>
+              <a:t>         … but they make your life easier in the end</a:t>
             </a:r>
             <a:endParaRPr lang="en-GB" sz="2800" b="1" dirty="0">
               <a:latin typeface="+mj-lt"/>

</xml_diff>